<commit_message>
#12 Update pptx, edit working with the best result
</commit_message>
<xml_diff>
--- a/Defence/Pseudo-3D-Maze-YAL.pptx
+++ b/Defence/Pseudo-3D-Maze-YAL.pptx
@@ -8,8 +8,9 @@
     <p:sldId id="256" r:id="rId2"/>
     <p:sldId id="257" r:id="rId3"/>
     <p:sldId id="258" r:id="rId4"/>
-    <p:sldId id="259" r:id="rId5"/>
-    <p:sldId id="260" r:id="rId6"/>
+    <p:sldId id="261" r:id="rId5"/>
+    <p:sldId id="259" r:id="rId6"/>
+    <p:sldId id="260" r:id="rId7"/>
   </p:sldIdLst>
   <p:sldSz cx="12192000" cy="6858000"/>
   <p:notesSz cx="6858000" cy="9144000"/>
@@ -3213,8 +3214,43 @@
                 <a:effectLst/>
                 <a:latin typeface="JetBrains Mono"/>
               </a:rPr>
-              <a:t>Игра бесконечный лабиринт</a:t>
-            </a:r>
+              <a:t>Игра бесконечный </a:t>
+            </a:r>
+            <a:r>
+              <a:rPr kumimoji="0" lang="ru-RU" altLang="ru-RU" sz="2800" b="0" i="0" u="none" strike="noStrike" cap="none" normalizeH="0" baseline="0" dirty="0" smtClean="0">
+                <a:ln>
+                  <a:noFill/>
+                </a:ln>
+                <a:effectLst/>
+                <a:latin typeface="JetBrains Mono"/>
+              </a:rPr>
+              <a:t>лабиринт</a:t>
+            </a:r>
+          </a:p>
+          <a:p>
+            <a:r>
+              <a:rPr lang="ru-RU" dirty="0"/>
+              <a:t>После нажатия на кнопку происходит запуск </a:t>
+            </a:r>
+            <a:r>
+              <a:rPr lang="ru-RU" dirty="0" err="1"/>
+              <a:t>отрисовки</a:t>
+            </a:r>
+            <a:r>
+              <a:rPr lang="ru-RU" dirty="0"/>
+              <a:t> кадров и главный таймер начинает обратный отсчет.</a:t>
+            </a:r>
+          </a:p>
+          <a:p>
+            <a:r>
+              <a:rPr lang="ru-RU" dirty="0"/>
+              <a:t>По истечению времени появляется финальное окно с возможностью начать сначала и результат попытки записывается в файл, если он лучший.</a:t>
+            </a:r>
+          </a:p>
+          <a:p>
+            <a:pPr marL="0" indent="0">
+              <a:buNone/>
+            </a:pPr>
             <a:endParaRPr lang="ru-RU" dirty="0"/>
           </a:p>
         </p:txBody>
@@ -3265,6 +3301,117 @@
           <a:lstStyle/>
           <a:p>
             <a:r>
+              <a:rPr lang="ru-RU" dirty="0" smtClean="0"/>
+              <a:t>Описание проекта. </a:t>
+            </a:r>
+            <a:r>
+              <a:rPr lang="en-US" dirty="0" smtClean="0"/>
+              <a:t>Ray casting.</a:t>
+            </a:r>
+            <a:endParaRPr lang="ru-RU" dirty="0"/>
+          </a:p>
+        </p:txBody>
+      </p:sp>
+      <p:sp>
+        <p:nvSpPr>
+          <p:cNvPr id="3" name="Объект 2"/>
+          <p:cNvSpPr>
+            <a:spLocks noGrp="1"/>
+          </p:cNvSpPr>
+          <p:nvPr>
+            <p:ph idx="1"/>
+          </p:nvPr>
+        </p:nvSpPr>
+        <p:spPr/>
+        <p:txBody>
+          <a:bodyPr/>
+          <a:lstStyle/>
+          <a:p>
+            <a:r>
+              <a:rPr lang="ru-RU" dirty="0"/>
+              <a:t>При </a:t>
+            </a:r>
+            <a:r>
+              <a:rPr lang="ru-RU" dirty="0" err="1"/>
+              <a:t>отрисовке</a:t>
+            </a:r>
+            <a:r>
+              <a:rPr lang="ru-RU" dirty="0"/>
+              <a:t> кадров используется технология </a:t>
+            </a:r>
+            <a:r>
+              <a:rPr lang="en-US" dirty="0"/>
+              <a:t>ray</a:t>
+            </a:r>
+            <a:r>
+              <a:rPr lang="ru-RU" dirty="0"/>
+              <a:t> </a:t>
+            </a:r>
+            <a:r>
+              <a:rPr lang="en-US" dirty="0"/>
+              <a:t>casting</a:t>
+            </a:r>
+            <a:r>
+              <a:rPr lang="ru-RU" dirty="0"/>
+              <a:t>. Он заключается в просчете расстояния до объекта и масштабирование относительно него. </a:t>
+            </a:r>
+            <a:r>
+              <a:rPr lang="ru-RU" dirty="0" smtClean="0"/>
+              <a:t>Таким образом создается псевдо-3д изображение.</a:t>
+            </a:r>
+            <a:endParaRPr lang="ru-RU" dirty="0"/>
+          </a:p>
+          <a:p>
+            <a:endParaRPr lang="ru-RU" dirty="0"/>
+          </a:p>
+        </p:txBody>
+      </p:sp>
+    </p:spTree>
+    <p:extLst>
+      <p:ext uri="{BB962C8B-B14F-4D97-AF65-F5344CB8AC3E}">
+        <p14:creationId xmlns:p14="http://schemas.microsoft.com/office/powerpoint/2010/main" val="210528878"/>
+      </p:ext>
+    </p:extLst>
+  </p:cSld>
+  <p:clrMapOvr>
+    <a:masterClrMapping/>
+  </p:clrMapOvr>
+</p:sld>
+</file>
+
+<file path=ppt/slides/slide5.xml><?xml version="1.0" encoding="utf-8"?>
+<p:sld xmlns:a="http://schemas.openxmlformats.org/drawingml/2006/main" xmlns:r="http://schemas.openxmlformats.org/officeDocument/2006/relationships" xmlns:p="http://schemas.openxmlformats.org/presentationml/2006/main">
+  <p:cSld>
+    <p:spTree>
+      <p:nvGrpSpPr>
+        <p:cNvPr id="1" name=""/>
+        <p:cNvGrpSpPr/>
+        <p:nvPr/>
+      </p:nvGrpSpPr>
+      <p:grpSpPr>
+        <a:xfrm>
+          <a:off x="0" y="0"/>
+          <a:ext cx="0" cy="0"/>
+          <a:chOff x="0" y="0"/>
+          <a:chExt cx="0" cy="0"/>
+        </a:xfrm>
+      </p:grpSpPr>
+      <p:sp>
+        <p:nvSpPr>
+          <p:cNvPr id="2" name="Заголовок 1"/>
+          <p:cNvSpPr>
+            <a:spLocks noGrp="1"/>
+          </p:cNvSpPr>
+          <p:nvPr>
+            <p:ph type="title"/>
+          </p:nvPr>
+        </p:nvSpPr>
+        <p:spPr/>
+        <p:txBody>
+          <a:bodyPr/>
+          <a:lstStyle/>
+          <a:p>
+            <a:r>
               <a:rPr lang="ru-RU" dirty="0"/>
               <a:t>Используемые файлы</a:t>
             </a:r>
@@ -3351,7 +3498,7 @@
 </p:sld>
 </file>
 
-<file path=ppt/slides/slide5.xml><?xml version="1.0" encoding="utf-8"?>
+<file path=ppt/slides/slide6.xml><?xml version="1.0" encoding="utf-8"?>
 <p:sld xmlns:a="http://schemas.openxmlformats.org/drawingml/2006/main" xmlns:r="http://schemas.openxmlformats.org/officeDocument/2006/relationships" xmlns:p="http://schemas.openxmlformats.org/presentationml/2006/main">
   <p:cSld>
     <p:spTree>

</xml_diff>